<commit_message>
Update Key- Value Data Store.pptx
</commit_message>
<xml_diff>
--- a/Key- Value Data Store.pptx
+++ b/Key- Value Data Store.pptx
@@ -104,6 +104,11 @@
       </a:defRPr>
     </a:lvl9pPr>
   </p:defaultTextStyle>
+  <p:extLst>
+    <p:ext uri="{EFAFB233-063F-42B5-8137-9DF3F51BA10A}">
+      <p15:sldGuideLst xmlns:p15="http://schemas.microsoft.com/office/powerpoint/2012/main"/>
+    </p:ext>
+  </p:extLst>
 </p:presentation>
 </file>
 
@@ -3429,7 +3434,7 @@
             <a:pPr algn="ctr"/>
             <a:r>
               <a:rPr lang="en-US" dirty="0"/>
-              <a:t>[Either with default or Custom File Path</a:t>
+              <a:t>[Either with default or Custom File Path]</a:t>
             </a:r>
             <a:endParaRPr lang="en-IN" dirty="0"/>
           </a:p>
@@ -3478,8 +3483,12 @@
           <a:p>
             <a:pPr algn="ctr"/>
             <a:r>
+              <a:rPr lang="en-US"/>
+              <a:t>Keep Task </a:t>
+            </a:r>
+            <a:r>
               <a:rPr lang="en-US" dirty="0"/>
-              <a:t>Keep Tack of keys that</a:t>
+              <a:t>of keys that</a:t>
             </a:r>
           </a:p>
           <a:p>

</xml_diff>